<commit_message>
Updates to the slides and added PDF.
</commit_message>
<xml_diff>
--- a/Slides/Introduction to ORMs.pptx
+++ b/Slides/Introduction to ORMs.pptx
@@ -5,10 +5,10 @@
     <p:sldMasterId id="2147483753" r:id="rId1"/>
   </p:sldMasterIdLst>
   <p:notesMasterIdLst>
-    <p:notesMasterId r:id="rId16"/>
+    <p:notesMasterId r:id="rId17"/>
   </p:notesMasterIdLst>
   <p:handoutMasterIdLst>
-    <p:handoutMasterId r:id="rId17"/>
+    <p:handoutMasterId r:id="rId18"/>
   </p:handoutMasterIdLst>
   <p:sldIdLst>
     <p:sldId id="256" r:id="rId2"/>
@@ -25,6 +25,7 @@
     <p:sldId id="278" r:id="rId13"/>
     <p:sldId id="276" r:id="rId14"/>
     <p:sldId id="273" r:id="rId15"/>
+    <p:sldId id="279" r:id="rId16"/>
   </p:sldIdLst>
   <p:sldSz cx="12192000" cy="6858000"/>
   <p:notesSz cx="6858000" cy="9144000"/>
@@ -7039,7 +7040,7 @@
           <a:p>
             <a:r>
               <a:rPr lang="en-CA" cap="none" dirty="0"/>
-              <a:t>NAIT</a:t>
+              <a:t>NAIT Digital Media and IT Students Association.</a:t>
             </a:r>
           </a:p>
         </p:txBody>
@@ -7854,9 +7855,16 @@
             <p:ph idx="1"/>
           </p:nvPr>
         </p:nvSpPr>
-        <p:spPr/>
-        <p:txBody>
-          <a:bodyPr/>
+        <p:spPr>
+          <a:xfrm>
+            <a:off x="913775" y="2008909"/>
+            <a:ext cx="10364452" cy="4668982"/>
+          </a:xfrm>
+        </p:spPr>
+        <p:txBody>
+          <a:bodyPr>
+            <a:normAutofit fontScale="85000" lnSpcReduction="20000"/>
+          </a:bodyPr>
           <a:lstStyle/>
           <a:p>
             <a:pPr marL="0" indent="0">
@@ -7864,7 +7872,7 @@
             </a:pPr>
             <a:r>
               <a:rPr lang="en-US" dirty="0"/>
-              <a:t>Entity Framework Core:</a:t>
+              <a:t>Slides and Example Code:</a:t>
             </a:r>
           </a:p>
           <a:p>
@@ -7875,6 +7883,69 @@
               <a:rPr lang="en-US" dirty="0">
                 <a:hlinkClick r:id="rId2"/>
               </a:rPr>
+              <a:t>https://github.com/saturdaymp/IntroductionToOrmsPresentation</a:t>
+            </a:r>
+            <a:endParaRPr lang="en-US" dirty="0"/>
+          </a:p>
+          <a:p>
+            <a:pPr marL="0" indent="0">
+              <a:buNone/>
+            </a:pPr>
+            <a:endParaRPr lang="en-US" dirty="0"/>
+          </a:p>
+          <a:p>
+            <a:pPr marL="0" indent="0">
+              <a:buNone/>
+            </a:pPr>
+            <a:r>
+              <a:rPr lang="en-US" dirty="0"/>
+              <a:t>Introduction to ORMs for DBAs:</a:t>
+            </a:r>
+          </a:p>
+          <a:p>
+            <a:pPr marL="0" indent="0">
+              <a:buNone/>
+            </a:pPr>
+            <a:r>
+              <a:rPr lang="en-US" dirty="0">
+                <a:hlinkClick r:id="rId3"/>
+              </a:rPr>
+              <a:t>https://github.com/saturdaymp/IntroductionToORMForDBAs</a:t>
+            </a:r>
+            <a:br>
+              <a:rPr lang="en-US" dirty="0"/>
+            </a:br>
+            <a:r>
+              <a:rPr lang="en-US" dirty="0">
+                <a:hlinkClick r:id="rId4"/>
+              </a:rPr>
+              <a:t>https://nftb.saturdaymp.com/category/software-development/introduction-to-orms-for-dbas/</a:t>
+            </a:r>
+            <a:endParaRPr lang="en-US" dirty="0"/>
+          </a:p>
+          <a:p>
+            <a:pPr marL="0" indent="0">
+              <a:buNone/>
+            </a:pPr>
+            <a:endParaRPr lang="en-US" dirty="0"/>
+          </a:p>
+          <a:p>
+            <a:pPr marL="0" indent="0">
+              <a:buNone/>
+            </a:pPr>
+            <a:r>
+              <a:rPr lang="en-US" dirty="0"/>
+              <a:t>Entity Framework Core:</a:t>
+            </a:r>
+          </a:p>
+          <a:p>
+            <a:pPr marL="0" indent="0">
+              <a:buNone/>
+            </a:pPr>
+            <a:r>
+              <a:rPr lang="en-US" dirty="0">
+                <a:hlinkClick r:id="rId5"/>
+              </a:rPr>
               <a:t>https://docs.microsoft.com/en-us/ef/core/</a:t>
             </a:r>
             <a:endParaRPr lang="en-US" dirty="0"/>
@@ -7883,6 +7954,27 @@
             <a:pPr marL="0" indent="0">
               <a:buNone/>
             </a:pPr>
+            <a:endParaRPr lang="en-US" dirty="0"/>
+          </a:p>
+          <a:p>
+            <a:pPr marL="0" indent="0">
+              <a:buNone/>
+            </a:pPr>
+            <a:r>
+              <a:rPr lang="en-US" dirty="0"/>
+              <a:t>Rails Active Record:</a:t>
+            </a:r>
+          </a:p>
+          <a:p>
+            <a:pPr marL="0" indent="0">
+              <a:buNone/>
+            </a:pPr>
+            <a:r>
+              <a:rPr lang="en-US" dirty="0">
+                <a:hlinkClick r:id="rId6"/>
+              </a:rPr>
+              <a:t>https://guides.rubyonrails.org/active_record_basics.html</a:t>
+            </a:r>
             <a:endParaRPr lang="en-US" dirty="0"/>
           </a:p>
           <a:p>
@@ -7897,6 +7989,466 @@
     <p:extLst>
       <p:ext uri="{BB962C8B-B14F-4D97-AF65-F5344CB8AC3E}">
         <p14:creationId xmlns:p14="http://schemas.microsoft.com/office/powerpoint/2010/main" val="70996243"/>
+      </p:ext>
+    </p:extLst>
+  </p:cSld>
+  <p:clrMapOvr>
+    <a:masterClrMapping/>
+  </p:clrMapOvr>
+</p:sld>
+</file>
+
+<file path=ppt/slides/slide15.xml><?xml version="1.0" encoding="utf-8"?>
+<p:sld xmlns:a="http://schemas.openxmlformats.org/drawingml/2006/main" xmlns:r="http://schemas.openxmlformats.org/officeDocument/2006/relationships" xmlns:p="http://schemas.openxmlformats.org/presentationml/2006/main">
+  <p:cSld>
+    <p:spTree>
+      <p:nvGrpSpPr>
+        <p:cNvPr id="1" name=""/>
+        <p:cNvGrpSpPr/>
+        <p:nvPr/>
+      </p:nvGrpSpPr>
+      <p:grpSpPr>
+        <a:xfrm>
+          <a:off x="0" y="0"/>
+          <a:ext cx="0" cy="0"/>
+          <a:chOff x="0" y="0"/>
+          <a:chExt cx="0" cy="0"/>
+        </a:xfrm>
+      </p:grpSpPr>
+      <p:sp>
+        <p:nvSpPr>
+          <p:cNvPr id="2" name="Title 1">
+            <a:extLst>
+              <a:ext uri="{FF2B5EF4-FFF2-40B4-BE49-F238E27FC236}">
+                <a16:creationId xmlns:a16="http://schemas.microsoft.com/office/drawing/2014/main" id="{33482EF1-CF19-4FAD-9B00-DB7481EE50DB}"/>
+              </a:ext>
+            </a:extLst>
+          </p:cNvPr>
+          <p:cNvSpPr>
+            <a:spLocks noGrp="1"/>
+          </p:cNvSpPr>
+          <p:nvPr>
+            <p:ph type="title"/>
+          </p:nvPr>
+        </p:nvSpPr>
+        <p:spPr/>
+        <p:txBody>
+          <a:bodyPr/>
+          <a:lstStyle/>
+          <a:p>
+            <a:r>
+              <a:rPr lang="en-CA" dirty="0"/>
+              <a:t>Contact Me</a:t>
+            </a:r>
+          </a:p>
+        </p:txBody>
+      </p:sp>
+      <p:sp>
+        <p:nvSpPr>
+          <p:cNvPr id="3" name="Content Placeholder 2">
+            <a:extLst>
+              <a:ext uri="{FF2B5EF4-FFF2-40B4-BE49-F238E27FC236}">
+                <a16:creationId xmlns:a16="http://schemas.microsoft.com/office/drawing/2014/main" id="{6135A3C4-388E-4772-BDC0-3F3B42A5CB5A}"/>
+              </a:ext>
+            </a:extLst>
+          </p:cNvPr>
+          <p:cNvSpPr>
+            <a:spLocks noGrp="1"/>
+          </p:cNvSpPr>
+          <p:nvPr>
+            <p:ph idx="1"/>
+          </p:nvPr>
+        </p:nvSpPr>
+        <p:spPr>
+          <a:xfrm>
+            <a:off x="913775" y="1925782"/>
+            <a:ext cx="10364452" cy="4641273"/>
+          </a:xfrm>
+        </p:spPr>
+        <p:txBody>
+          <a:bodyPr>
+            <a:normAutofit lnSpcReduction="10000"/>
+          </a:bodyPr>
+          <a:lstStyle/>
+          <a:p>
+            <a:pPr marL="0" indent="0">
+              <a:buNone/>
+            </a:pPr>
+            <a:r>
+              <a:rPr lang="en-CA" sz="3200" dirty="0">
+                <a:hlinkClick r:id="rId2"/>
+              </a:rPr>
+              <a:t>http://</a:t>
+            </a:r>
+            <a:r>
+              <a:rPr lang="en-CA" sz="3200" dirty="0" err="1">
+                <a:hlinkClick r:id="rId2"/>
+              </a:rPr>
+              <a:t>nftb.saturdaymp.co</a:t>
+            </a:r>
+            <a:r>
+              <a:rPr lang="en-CA" sz="3200" dirty="0" err="1">
+                <a:hlinkClick r:id="rId2"/>
+              </a:rPr>
+              <a:t>m</a:t>
+            </a:r>
+            <a:endParaRPr lang="en-CA" sz="3200" dirty="0"/>
+          </a:p>
+          <a:p>
+            <a:pPr marL="0" indent="0">
+              <a:buNone/>
+            </a:pPr>
+            <a:r>
+              <a:rPr lang="en-CA" sz="3200" dirty="0">
+                <a:solidFill>
+                  <a:srgbClr val="56BCFF"/>
+                </a:solidFill>
+              </a:rPr>
+              <a:t>@</a:t>
+            </a:r>
+            <a:r>
+              <a:rPr lang="en-CA" sz="3200" dirty="0" err="1">
+                <a:solidFill>
+                  <a:srgbClr val="56BCFF"/>
+                </a:solidFill>
+              </a:rPr>
+              <a:t>saturdaymp</a:t>
+            </a:r>
+            <a:endParaRPr lang="en-CA" sz="3200" dirty="0">
+              <a:solidFill>
+                <a:srgbClr val="56BCFF"/>
+              </a:solidFill>
+              <a:hlinkClick r:id="rId3"/>
+            </a:endParaRPr>
+          </a:p>
+          <a:p>
+            <a:pPr marL="0" indent="0">
+              <a:buNone/>
+            </a:pPr>
+            <a:r>
+              <a:rPr lang="en-CA" sz="3200" dirty="0">
+                <a:hlinkClick r:id="rId3"/>
+              </a:rPr>
+              <a:t>https://github.com/saturdaymp</a:t>
+            </a:r>
+            <a:endParaRPr lang="en-CA" sz="3200" dirty="0">
+              <a:hlinkClick r:id="rId4"/>
+            </a:endParaRPr>
+          </a:p>
+          <a:p>
+            <a:pPr marL="0" indent="0">
+              <a:buNone/>
+            </a:pPr>
+            <a:r>
+              <a:rPr lang="en-CA" sz="3200" dirty="0">
+                <a:hlinkClick r:id="rId4"/>
+              </a:rPr>
+              <a:t>chris.cumming@satudaymp.com</a:t>
+            </a:r>
+            <a:endParaRPr lang="en-CA" sz="3200" dirty="0"/>
+          </a:p>
+          <a:p>
+            <a:pPr marL="0" indent="0">
+              <a:buNone/>
+            </a:pPr>
+            <a:endParaRPr lang="en-CA" dirty="0"/>
+          </a:p>
+          <a:p>
+            <a:pPr marL="0" indent="0">
+              <a:buNone/>
+            </a:pPr>
+            <a:r>
+              <a:rPr lang="en-CA" sz="3200" dirty="0">
+                <a:hlinkClick r:id="rId5"/>
+              </a:rPr>
+              <a:t>http://edmug.net</a:t>
+            </a:r>
+            <a:endParaRPr lang="en-CA" sz="3200" dirty="0"/>
+          </a:p>
+          <a:p>
+            <a:pPr marL="0" indent="0">
+              <a:buNone/>
+            </a:pPr>
+            <a:r>
+              <a:rPr lang="en-CA" sz="3200" dirty="0">
+                <a:hlinkClick r:id="rId6"/>
+              </a:rPr>
+              <a:t>info@edmug.net</a:t>
+            </a:r>
+            <a:endParaRPr lang="en-CA" sz="3200" dirty="0"/>
+          </a:p>
+          <a:p>
+            <a:pPr marL="0" indent="0">
+              <a:buNone/>
+            </a:pPr>
+            <a:endParaRPr lang="en-CA" dirty="0"/>
+          </a:p>
+          <a:p>
+            <a:pPr marL="0" indent="0">
+              <a:buNone/>
+            </a:pPr>
+            <a:endParaRPr lang="en-CA" dirty="0"/>
+          </a:p>
+        </p:txBody>
+      </p:sp>
+      <p:pic>
+        <p:nvPicPr>
+          <p:cNvPr id="13" name="Picture 12">
+            <a:extLst>
+              <a:ext uri="{FF2B5EF4-FFF2-40B4-BE49-F238E27FC236}">
+                <a16:creationId xmlns:a16="http://schemas.microsoft.com/office/drawing/2014/main" id="{1955F3B5-0ED1-466C-A69A-5A3D52637EA1}"/>
+              </a:ext>
+            </a:extLst>
+          </p:cNvPr>
+          <p:cNvPicPr>
+            <a:picLocks noChangeAspect="1"/>
+          </p:cNvPicPr>
+          <p:nvPr/>
+        </p:nvPicPr>
+        <p:blipFill>
+          <a:blip r:embed="rId7">
+            <a:extLst>
+              <a:ext uri="{28A0092B-C50C-407E-A947-70E740481C1C}">
+                <a14:useLocalDpi xmlns:a14="http://schemas.microsoft.com/office/drawing/2010/main" val="0"/>
+              </a:ext>
+            </a:extLst>
+          </a:blip>
+          <a:stretch>
+            <a:fillRect/>
+          </a:stretch>
+        </p:blipFill>
+        <p:spPr>
+          <a:xfrm>
+            <a:off x="8030194" y="2071370"/>
+            <a:ext cx="3248032" cy="996063"/>
+          </a:xfrm>
+          <a:prstGeom prst="rect">
+            <a:avLst/>
+          </a:prstGeom>
+        </p:spPr>
+      </p:pic>
+      <p:sp>
+        <p:nvSpPr>
+          <p:cNvPr id="8" name="TextBox 7">
+            <a:extLst>
+              <a:ext uri="{FF2B5EF4-FFF2-40B4-BE49-F238E27FC236}">
+                <a16:creationId xmlns:a16="http://schemas.microsoft.com/office/drawing/2014/main" id="{ECC7BD10-8107-BA4F-9207-B0C5EB41D941}"/>
+              </a:ext>
+            </a:extLst>
+          </p:cNvPr>
+          <p:cNvSpPr txBox="1"/>
+          <p:nvPr/>
+        </p:nvSpPr>
+        <p:spPr>
+          <a:xfrm>
+            <a:off x="5340485" y="2451370"/>
+            <a:ext cx="184731" cy="369332"/>
+          </a:xfrm>
+          <a:prstGeom prst="rect">
+            <a:avLst/>
+          </a:prstGeom>
+          <a:noFill/>
+        </p:spPr>
+        <p:txBody>
+          <a:bodyPr wrap="none" rtlCol="0">
+            <a:spAutoFit/>
+          </a:bodyPr>
+          <a:lstStyle/>
+          <a:p>
+            <a:endParaRPr lang="en-US"/>
+          </a:p>
+        </p:txBody>
+      </p:sp>
+      <p:pic>
+        <p:nvPicPr>
+          <p:cNvPr id="7" name="Picture 6">
+            <a:extLst>
+              <a:ext uri="{FF2B5EF4-FFF2-40B4-BE49-F238E27FC236}">
+                <a16:creationId xmlns:a16="http://schemas.microsoft.com/office/drawing/2014/main" id="{311CD3FA-6030-234D-966D-8E6D5688211C}"/>
+              </a:ext>
+            </a:extLst>
+          </p:cNvPr>
+          <p:cNvPicPr>
+            <a:picLocks noChangeAspect="1"/>
+          </p:cNvPicPr>
+          <p:nvPr/>
+        </p:nvPicPr>
+        <p:blipFill>
+          <a:blip r:embed="rId8">
+            <a:extLst>
+              <a:ext uri="{28A0092B-C50C-407E-A947-70E740481C1C}">
+                <a14:useLocalDpi xmlns:a14="http://schemas.microsoft.com/office/drawing/2010/main" val="0"/>
+              </a:ext>
+            </a:extLst>
+          </a:blip>
+          <a:stretch>
+            <a:fillRect/>
+          </a:stretch>
+        </p:blipFill>
+        <p:spPr>
+          <a:xfrm>
+            <a:off x="8511210" y="3246948"/>
+            <a:ext cx="2286000" cy="914400"/>
+          </a:xfrm>
+          <a:prstGeom prst="rect">
+            <a:avLst/>
+          </a:prstGeom>
+        </p:spPr>
+      </p:pic>
+      <p:pic>
+        <p:nvPicPr>
+          <p:cNvPr id="9" name="Picture 8">
+            <a:extLst>
+              <a:ext uri="{FF2B5EF4-FFF2-40B4-BE49-F238E27FC236}">
+                <a16:creationId xmlns:a16="http://schemas.microsoft.com/office/drawing/2014/main" id="{F11E8F59-97D2-2B41-B116-E1BFB7F4510B}"/>
+              </a:ext>
+            </a:extLst>
+          </p:cNvPr>
+          <p:cNvPicPr>
+            <a:picLocks noChangeAspect="1"/>
+          </p:cNvPicPr>
+          <p:nvPr/>
+        </p:nvPicPr>
+        <p:blipFill>
+          <a:blip r:embed="rId9"/>
+          <a:stretch>
+            <a:fillRect/>
+          </a:stretch>
+        </p:blipFill>
+        <p:spPr>
+          <a:xfrm>
+            <a:off x="8839347" y="4313747"/>
+            <a:ext cx="623219" cy="623219"/>
+          </a:xfrm>
+          <a:prstGeom prst="rect">
+            <a:avLst/>
+          </a:prstGeom>
+        </p:spPr>
+      </p:pic>
+      <p:pic>
+        <p:nvPicPr>
+          <p:cNvPr id="10" name="Picture 9">
+            <a:extLst>
+              <a:ext uri="{FF2B5EF4-FFF2-40B4-BE49-F238E27FC236}">
+                <a16:creationId xmlns:a16="http://schemas.microsoft.com/office/drawing/2014/main" id="{DA30C32A-6F06-7445-A214-86B011BEB8FD}"/>
+              </a:ext>
+            </a:extLst>
+          </p:cNvPr>
+          <p:cNvPicPr>
+            <a:picLocks noChangeAspect="1"/>
+          </p:cNvPicPr>
+          <p:nvPr/>
+        </p:nvPicPr>
+        <p:blipFill>
+          <a:blip r:embed="rId10"/>
+          <a:stretch>
+            <a:fillRect/>
+          </a:stretch>
+        </p:blipFill>
+        <p:spPr>
+          <a:xfrm>
+            <a:off x="7971988" y="4313747"/>
+            <a:ext cx="659187" cy="659187"/>
+          </a:xfrm>
+          <a:prstGeom prst="rect">
+            <a:avLst/>
+          </a:prstGeom>
+        </p:spPr>
+      </p:pic>
+      <p:pic>
+        <p:nvPicPr>
+          <p:cNvPr id="12" name="Picture 11">
+            <a:extLst>
+              <a:ext uri="{FF2B5EF4-FFF2-40B4-BE49-F238E27FC236}">
+                <a16:creationId xmlns:a16="http://schemas.microsoft.com/office/drawing/2014/main" id="{2F1124BE-5BCE-1149-BC06-8CC47737E117}"/>
+              </a:ext>
+            </a:extLst>
+          </p:cNvPr>
+          <p:cNvPicPr>
+            <a:picLocks noChangeAspect="1"/>
+          </p:cNvPicPr>
+          <p:nvPr/>
+        </p:nvPicPr>
+        <p:blipFill>
+          <a:blip r:embed="rId11"/>
+          <a:stretch>
+            <a:fillRect/>
+          </a:stretch>
+        </p:blipFill>
+        <p:spPr>
+          <a:xfrm>
+            <a:off x="9673422" y="4397692"/>
+            <a:ext cx="491296" cy="491296"/>
+          </a:xfrm>
+          <a:prstGeom prst="rect">
+            <a:avLst/>
+          </a:prstGeom>
+        </p:spPr>
+      </p:pic>
+      <p:pic>
+        <p:nvPicPr>
+          <p:cNvPr id="14" name="Picture 13">
+            <a:extLst>
+              <a:ext uri="{FF2B5EF4-FFF2-40B4-BE49-F238E27FC236}">
+                <a16:creationId xmlns:a16="http://schemas.microsoft.com/office/drawing/2014/main" id="{E899E4C1-BD9A-2444-8540-CC116FF044C9}"/>
+              </a:ext>
+            </a:extLst>
+          </p:cNvPr>
+          <p:cNvPicPr>
+            <a:picLocks noChangeAspect="1"/>
+          </p:cNvPicPr>
+          <p:nvPr/>
+        </p:nvPicPr>
+        <p:blipFill>
+          <a:blip r:embed="rId12"/>
+          <a:stretch>
+            <a:fillRect/>
+          </a:stretch>
+        </p:blipFill>
+        <p:spPr>
+          <a:xfrm>
+            <a:off x="10372110" y="4407351"/>
+            <a:ext cx="481637" cy="481637"/>
+          </a:xfrm>
+          <a:prstGeom prst="rect">
+            <a:avLst/>
+          </a:prstGeom>
+        </p:spPr>
+      </p:pic>
+      <p:pic>
+        <p:nvPicPr>
+          <p:cNvPr id="15" name="Picture 14">
+            <a:extLst>
+              <a:ext uri="{FF2B5EF4-FFF2-40B4-BE49-F238E27FC236}">
+                <a16:creationId xmlns:a16="http://schemas.microsoft.com/office/drawing/2014/main" id="{9F33F719-85CC-4547-89AB-0F0F271FC877}"/>
+              </a:ext>
+            </a:extLst>
+          </p:cNvPr>
+          <p:cNvPicPr>
+            <a:picLocks noChangeAspect="1"/>
+          </p:cNvPicPr>
+          <p:nvPr/>
+        </p:nvPicPr>
+        <p:blipFill>
+          <a:blip r:embed="rId13"/>
+          <a:stretch>
+            <a:fillRect/>
+          </a:stretch>
+        </p:blipFill>
+        <p:spPr>
+          <a:xfrm>
+            <a:off x="11061139" y="4320044"/>
+            <a:ext cx="640902" cy="610623"/>
+          </a:xfrm>
+          <a:prstGeom prst="rect">
+            <a:avLst/>
+          </a:prstGeom>
+        </p:spPr>
+      </p:pic>
+    </p:spTree>
+    <p:extLst>
+      <p:ext uri="{BB962C8B-B14F-4D97-AF65-F5344CB8AC3E}">
+        <p14:creationId xmlns:p14="http://schemas.microsoft.com/office/powerpoint/2010/main" val="2440852862"/>
       </p:ext>
     </p:extLst>
   </p:cSld>
@@ -7946,7 +8498,7 @@
           <a:p>
             <a:r>
               <a:rPr lang="en-US" dirty="0"/>
-              <a:t>Prerequisites to Run Demos</a:t>
+              <a:t>Demos</a:t>
             </a:r>
           </a:p>
         </p:txBody>
@@ -7967,10 +8519,15 @@
             <p:ph idx="1"/>
           </p:nvPr>
         </p:nvSpPr>
-        <p:spPr/>
+        <p:spPr>
+          <a:xfrm>
+            <a:off x="913775" y="1925782"/>
+            <a:ext cx="10364452" cy="4641273"/>
+          </a:xfrm>
+        </p:spPr>
         <p:txBody>
           <a:bodyPr>
-            <a:normAutofit/>
+            <a:normAutofit lnSpcReduction="10000"/>
           </a:bodyPr>
           <a:lstStyle/>
           <a:p>
@@ -7984,42 +8541,99 @@
           </a:p>
           <a:p>
             <a:pPr marL="0" indent="0">
-              <a:buNone/>
-            </a:pPr>
-            <a:endParaRPr lang="en-US" dirty="0"/>
-          </a:p>
-          <a:p>
-            <a:pPr marL="0" indent="0">
-              <a:buNone/>
-            </a:pPr>
-            <a:r>
-              <a:rPr lang="en-US" dirty="0"/>
-              <a:t>Visual Studio 2017</a:t>
-            </a:r>
-          </a:p>
-          <a:p>
-            <a:pPr marL="457200" lvl="1" indent="0">
               <a:buNone/>
             </a:pPr>
             <a:r>
               <a:rPr lang="en-US" dirty="0">
                 <a:hlinkClick r:id="rId2"/>
               </a:rPr>
-              <a:t>https://www.visualstudio.com/</a:t>
+              <a:t>https://github.com/saturdaymp/IntroductionToOrmsPresentation</a:t>
             </a:r>
             <a:endParaRPr lang="en-US" dirty="0"/>
           </a:p>
           <a:p>
-            <a:pPr marL="457200" lvl="1" indent="0">
-              <a:buNone/>
-            </a:pPr>
+            <a:pPr marL="0" indent="0">
+              <a:buNone/>
+            </a:pPr>
+            <a:endParaRPr lang="en-US" dirty="0"/>
+          </a:p>
+          <a:p>
+            <a:pPr marL="0" indent="0">
+              <a:buNone/>
+            </a:pPr>
+            <a:r>
+              <a:rPr lang="en-US" dirty="0"/>
+              <a:t>Prerequisites:</a:t>
+            </a:r>
+          </a:p>
+          <a:p>
+            <a:pPr lvl="1"/>
+            <a:r>
+              <a:rPr lang="en-US" dirty="0"/>
+              <a:t>Visual Studio 2017 (free community version for Windows or Mac):</a:t>
+            </a:r>
             <a:br>
               <a:rPr lang="en-US" dirty="0"/>
             </a:br>
             <a:r>
+              <a:rPr lang="en-US" dirty="0">
+                <a:hlinkClick r:id="rId3"/>
+              </a:rPr>
+              <a:t>https://www.visualstudio.com/</a:t>
+            </a:r>
+            <a:endParaRPr lang="en-US" dirty="0"/>
+          </a:p>
+          <a:p>
+            <a:pPr marL="457200" lvl="1" indent="0">
+              <a:buNone/>
+            </a:pPr>
+            <a:endParaRPr lang="en-US" dirty="0"/>
+          </a:p>
+          <a:p>
+            <a:pPr lvl="1"/>
+            <a:r>
               <a:rPr lang="en-US" dirty="0"/>
-              <a:t>There is a free community version and VS 2017 Should install most things you need.</a:t>
-            </a:r>
+              <a:t>.NET Core 2.1</a:t>
+            </a:r>
+            <a:br>
+              <a:rPr lang="en-US" dirty="0"/>
+            </a:br>
+            <a:r>
+              <a:rPr lang="en-US" dirty="0">
+                <a:hlinkClick r:id="rId4"/>
+              </a:rPr>
+              <a:t>https://www.microsoft.com/net/download</a:t>
+            </a:r>
+            <a:endParaRPr lang="en-US" dirty="0"/>
+          </a:p>
+          <a:p>
+            <a:pPr marL="457200" lvl="1" indent="0">
+              <a:buNone/>
+            </a:pPr>
+            <a:endParaRPr lang="en-US" dirty="0"/>
+          </a:p>
+          <a:p>
+            <a:pPr lvl="1"/>
+            <a:r>
+              <a:rPr lang="en-US" dirty="0"/>
+              <a:t>Docker (free community version):</a:t>
+            </a:r>
+            <a:br>
+              <a:rPr lang="en-US" dirty="0"/>
+            </a:br>
+            <a:r>
+              <a:rPr lang="en-US" dirty="0">
+                <a:hlinkClick r:id="rId5"/>
+              </a:rPr>
+              <a:t>https://www.docker.com/docker-community</a:t>
+            </a:r>
+            <a:endParaRPr lang="en-US" dirty="0"/>
+          </a:p>
+          <a:p>
+            <a:pPr marL="457200" lvl="1" indent="0">
+              <a:buNone/>
+            </a:pPr>
+            <a:endParaRPr lang="en-US" dirty="0"/>
           </a:p>
           <a:p>
             <a:pPr marL="0" indent="0">
@@ -8135,18 +8749,26 @@
               <a:buNone/>
             </a:pPr>
             <a:r>
+              <a:rPr lang="en-CA" sz="1800" dirty="0"/>
+              <a:t>@</a:t>
+            </a:r>
+            <a:r>
+              <a:rPr lang="en-CA" sz="1800" dirty="0" err="1"/>
+              <a:t>saturdaymp</a:t>
+            </a:r>
+            <a:endParaRPr lang="en-CA" sz="1800" dirty="0"/>
+          </a:p>
+          <a:p>
+            <a:pPr marL="0" indent="0">
+              <a:buNone/>
+            </a:pPr>
+            <a:r>
               <a:rPr lang="en-CA" sz="1800" dirty="0">
                 <a:hlinkClick r:id="rId3"/>
               </a:rPr>
               <a:t>chris.cumming@satudaymp.com</a:t>
             </a:r>
             <a:endParaRPr lang="en-CA" sz="1800" dirty="0"/>
-          </a:p>
-          <a:p>
-            <a:pPr marL="0" indent="0">
-              <a:buNone/>
-            </a:pPr>
-            <a:endParaRPr lang="en-CA" dirty="0"/>
           </a:p>
           <a:p>
             <a:pPr marL="0" indent="0">

</xml_diff>